<commit_message>
4.0.2 2022.06.30 - Program files 에 설치시 권한문제로 안되는 경우가 있어 설치를 c:/ezdiatech/AnalysisSW 로 고정 - 실험 할때마다 Result 폴더 밑에 날자 / 시간 폴더 에 영상이 생기도록 함 ---------------------------------------------------------- 4.0.3 2022.07.01 - 실험결과 엑셀을 물어보지 않고 실험폴더에 같이 저장 (ex  \result\220701\091927\220701_091927_Results.xlsx) ---------------------------------------------------------- 4.0.4 2022.07.01 - Image폴더를 변경 할수 있는 기능 추가 (경로에 한글 포한하면 안됨)
</commit_message>
<xml_diff>
--- a/AnalysisSW/01.Manual/사용한ppt/analy메뉴.pptx
+++ b/AnalysisSW/01.Manual/사용한ppt/analy메뉴.pptx
@@ -260,7 +260,7 @@
           <a:p>
             <a:fld id="{CC0E6473-7331-49BB-A22F-9F3ADA6997B2}" type="datetimeFigureOut">
               <a:rPr lang="ko-KR" altLang="en-US" smtClean="0"/>
-              <a:t>2022-06-24</a:t>
+              <a:t>2022-07-05</a:t>
             </a:fld>
             <a:endParaRPr lang="ko-KR" altLang="en-US"/>
           </a:p>
@@ -458,7 +458,7 @@
           <a:p>
             <a:fld id="{CC0E6473-7331-49BB-A22F-9F3ADA6997B2}" type="datetimeFigureOut">
               <a:rPr lang="ko-KR" altLang="en-US" smtClean="0"/>
-              <a:t>2022-06-24</a:t>
+              <a:t>2022-07-05</a:t>
             </a:fld>
             <a:endParaRPr lang="ko-KR" altLang="en-US"/>
           </a:p>
@@ -666,7 +666,7 @@
           <a:p>
             <a:fld id="{CC0E6473-7331-49BB-A22F-9F3ADA6997B2}" type="datetimeFigureOut">
               <a:rPr lang="ko-KR" altLang="en-US" smtClean="0"/>
-              <a:t>2022-06-24</a:t>
+              <a:t>2022-07-05</a:t>
             </a:fld>
             <a:endParaRPr lang="ko-KR" altLang="en-US"/>
           </a:p>
@@ -864,7 +864,7 @@
           <a:p>
             <a:fld id="{CC0E6473-7331-49BB-A22F-9F3ADA6997B2}" type="datetimeFigureOut">
               <a:rPr lang="ko-KR" altLang="en-US" smtClean="0"/>
-              <a:t>2022-06-24</a:t>
+              <a:t>2022-07-05</a:t>
             </a:fld>
             <a:endParaRPr lang="ko-KR" altLang="en-US"/>
           </a:p>
@@ -1139,7 +1139,7 @@
           <a:p>
             <a:fld id="{CC0E6473-7331-49BB-A22F-9F3ADA6997B2}" type="datetimeFigureOut">
               <a:rPr lang="ko-KR" altLang="en-US" smtClean="0"/>
-              <a:t>2022-06-24</a:t>
+              <a:t>2022-07-05</a:t>
             </a:fld>
             <a:endParaRPr lang="ko-KR" altLang="en-US"/>
           </a:p>
@@ -1404,7 +1404,7 @@
           <a:p>
             <a:fld id="{CC0E6473-7331-49BB-A22F-9F3ADA6997B2}" type="datetimeFigureOut">
               <a:rPr lang="ko-KR" altLang="en-US" smtClean="0"/>
-              <a:t>2022-06-24</a:t>
+              <a:t>2022-07-05</a:t>
             </a:fld>
             <a:endParaRPr lang="ko-KR" altLang="en-US"/>
           </a:p>
@@ -1816,7 +1816,7 @@
           <a:p>
             <a:fld id="{CC0E6473-7331-49BB-A22F-9F3ADA6997B2}" type="datetimeFigureOut">
               <a:rPr lang="ko-KR" altLang="en-US" smtClean="0"/>
-              <a:t>2022-06-24</a:t>
+              <a:t>2022-07-05</a:t>
             </a:fld>
             <a:endParaRPr lang="ko-KR" altLang="en-US"/>
           </a:p>
@@ -1957,7 +1957,7 @@
           <a:p>
             <a:fld id="{CC0E6473-7331-49BB-A22F-9F3ADA6997B2}" type="datetimeFigureOut">
               <a:rPr lang="ko-KR" altLang="en-US" smtClean="0"/>
-              <a:t>2022-06-24</a:t>
+              <a:t>2022-07-05</a:t>
             </a:fld>
             <a:endParaRPr lang="ko-KR" altLang="en-US"/>
           </a:p>
@@ -2070,7 +2070,7 @@
           <a:p>
             <a:fld id="{CC0E6473-7331-49BB-A22F-9F3ADA6997B2}" type="datetimeFigureOut">
               <a:rPr lang="ko-KR" altLang="en-US" smtClean="0"/>
-              <a:t>2022-06-24</a:t>
+              <a:t>2022-07-05</a:t>
             </a:fld>
             <a:endParaRPr lang="ko-KR" altLang="en-US"/>
           </a:p>
@@ -2381,7 +2381,7 @@
           <a:p>
             <a:fld id="{CC0E6473-7331-49BB-A22F-9F3ADA6997B2}" type="datetimeFigureOut">
               <a:rPr lang="ko-KR" altLang="en-US" smtClean="0"/>
-              <a:t>2022-06-24</a:t>
+              <a:t>2022-07-05</a:t>
             </a:fld>
             <a:endParaRPr lang="ko-KR" altLang="en-US"/>
           </a:p>
@@ -2669,7 +2669,7 @@
           <a:p>
             <a:fld id="{CC0E6473-7331-49BB-A22F-9F3ADA6997B2}" type="datetimeFigureOut">
               <a:rPr lang="ko-KR" altLang="en-US" smtClean="0"/>
-              <a:t>2022-06-24</a:t>
+              <a:t>2022-07-05</a:t>
             </a:fld>
             <a:endParaRPr lang="ko-KR" altLang="en-US"/>
           </a:p>
@@ -2910,7 +2910,7 @@
           <a:p>
             <a:fld id="{CC0E6473-7331-49BB-A22F-9F3ADA6997B2}" type="datetimeFigureOut">
               <a:rPr lang="ko-KR" altLang="en-US" smtClean="0"/>
-              <a:t>2022-06-24</a:t>
+              <a:t>2022-07-05</a:t>
             </a:fld>
             <a:endParaRPr lang="ko-KR" altLang="en-US"/>
           </a:p>
@@ -4303,7 +4303,7 @@
         </p:blipFill>
         <p:spPr>
           <a:xfrm>
-            <a:off x="3748296" y="1241702"/>
+            <a:off x="846834" y="1830787"/>
             <a:ext cx="3892689" cy="4306198"/>
           </a:xfrm>
           <a:prstGeom prst="rect">
@@ -4325,8 +4325,8 @@
         </p:nvSpPr>
         <p:spPr>
           <a:xfrm>
-            <a:off x="1439333" y="1032933"/>
-            <a:ext cx="914400" cy="1477328"/>
+            <a:off x="182033" y="43601"/>
+            <a:ext cx="914400" cy="1754326"/>
           </a:xfrm>
           <a:prstGeom prst="rect">
             <a:avLst/>
@@ -4345,7 +4345,7 @@
                   <a:srgbClr val="FF0000"/>
                 </a:solidFill>
               </a:rPr>
-              <a:t>①②④⑤⑥⑦③⑧⑨⑩⑪⑫⑬⑭</a:t>
+              <a:t>①②④⑤⑥⑦③⑧⑨⑩⑪⑫⑬⑭⑮</a:t>
             </a:r>
             <a:r>
               <a:rPr lang="ko-KR" altLang="en-US" b="1" dirty="0" err="1">
@@ -4377,7 +4377,7 @@
         </p:nvSpPr>
         <p:spPr>
           <a:xfrm>
-            <a:off x="7112001" y="1632312"/>
+            <a:off x="4210539" y="2221397"/>
             <a:ext cx="528984" cy="923330"/>
           </a:xfrm>
           <a:prstGeom prst="rect">
@@ -4434,7 +4434,7 @@
         </p:nvSpPr>
         <p:spPr>
           <a:xfrm>
-            <a:off x="4191000" y="2726576"/>
+            <a:off x="1289538" y="3315661"/>
             <a:ext cx="3197559" cy="369332"/>
           </a:xfrm>
           <a:prstGeom prst="rect">
@@ -4474,7 +4474,7 @@
         </p:nvSpPr>
         <p:spPr>
           <a:xfrm>
-            <a:off x="4377266" y="3059668"/>
+            <a:off x="1475804" y="3648753"/>
             <a:ext cx="916335" cy="369332"/>
           </a:xfrm>
           <a:prstGeom prst="rect">
@@ -4514,7 +4514,7 @@
         </p:nvSpPr>
         <p:spPr>
           <a:xfrm>
-            <a:off x="7128934" y="2357244"/>
+            <a:off x="4227472" y="2946329"/>
             <a:ext cx="512052" cy="369332"/>
           </a:xfrm>
           <a:prstGeom prst="rect">
@@ -4554,7 +4554,7 @@
         </p:nvSpPr>
         <p:spPr>
           <a:xfrm>
-            <a:off x="6618817" y="3078202"/>
+            <a:off x="3717355" y="3667287"/>
             <a:ext cx="837478" cy="369332"/>
           </a:xfrm>
           <a:prstGeom prst="rect">
@@ -4594,7 +4594,7 @@
         </p:nvSpPr>
         <p:spPr>
           <a:xfrm>
-            <a:off x="5573186" y="3076496"/>
+            <a:off x="2671724" y="3665581"/>
             <a:ext cx="766046" cy="369332"/>
           </a:xfrm>
           <a:prstGeom prst="rect">
@@ -4634,7 +4634,7 @@
         </p:nvSpPr>
         <p:spPr>
           <a:xfrm>
-            <a:off x="6028267" y="2532954"/>
+            <a:off x="3126805" y="3122039"/>
             <a:ext cx="690215" cy="369332"/>
           </a:xfrm>
           <a:prstGeom prst="rect">
@@ -4674,7 +4674,7 @@
         </p:nvSpPr>
         <p:spPr>
           <a:xfrm>
-            <a:off x="3485481" y="3567072"/>
+            <a:off x="584019" y="4156157"/>
             <a:ext cx="3280421" cy="369332"/>
           </a:xfrm>
           <a:prstGeom prst="rect">
@@ -4714,7 +4714,7 @@
         </p:nvSpPr>
         <p:spPr>
           <a:xfrm>
-            <a:off x="5280581" y="1953642"/>
+            <a:off x="2379119" y="2542727"/>
             <a:ext cx="1958419" cy="444606"/>
           </a:xfrm>
           <a:prstGeom prst="rect">
@@ -4766,7 +4766,7 @@
         </p:nvSpPr>
         <p:spPr>
           <a:xfrm>
-            <a:off x="3741539" y="1651000"/>
+            <a:off x="840077" y="2240085"/>
             <a:ext cx="1321530" cy="1390133"/>
           </a:xfrm>
           <a:prstGeom prst="rect">
@@ -4818,7 +4818,7 @@
         </p:nvSpPr>
         <p:spPr>
           <a:xfrm>
-            <a:off x="5297287" y="2439630"/>
+            <a:off x="2395825" y="3028715"/>
             <a:ext cx="1933246" cy="185965"/>
           </a:xfrm>
           <a:prstGeom prst="rect">
@@ -4870,7 +4870,7 @@
         </p:nvSpPr>
         <p:spPr>
           <a:xfrm>
-            <a:off x="3798239" y="3490917"/>
+            <a:off x="896777" y="4080002"/>
             <a:ext cx="2407828" cy="390799"/>
           </a:xfrm>
           <a:prstGeom prst="rect">
@@ -4922,7 +4922,7 @@
         </p:nvSpPr>
         <p:spPr>
           <a:xfrm>
-            <a:off x="7045486" y="3394801"/>
+            <a:off x="4144024" y="3983886"/>
             <a:ext cx="632883" cy="369332"/>
           </a:xfrm>
           <a:prstGeom prst="rect">
@@ -4962,7 +4962,7 @@
         </p:nvSpPr>
         <p:spPr>
           <a:xfrm>
-            <a:off x="7388559" y="3730752"/>
+            <a:off x="4487097" y="4319837"/>
             <a:ext cx="447506" cy="369332"/>
           </a:xfrm>
           <a:prstGeom prst="rect">
@@ -5002,7 +5002,7 @@
         </p:nvSpPr>
         <p:spPr>
           <a:xfrm>
-            <a:off x="3753788" y="5209007"/>
+            <a:off x="852326" y="5798092"/>
             <a:ext cx="4150012" cy="369332"/>
           </a:xfrm>
           <a:prstGeom prst="rect">
@@ -5042,7 +5042,7 @@
         </p:nvSpPr>
         <p:spPr>
           <a:xfrm>
-            <a:off x="3788331" y="4055942"/>
+            <a:off x="886869" y="4645027"/>
             <a:ext cx="3890038" cy="1441393"/>
           </a:xfrm>
           <a:prstGeom prst="rect">
@@ -5102,7 +5102,7 @@
         </p:blipFill>
         <p:spPr>
           <a:xfrm>
-            <a:off x="3748295" y="1195275"/>
+            <a:off x="846833" y="1784360"/>
             <a:ext cx="3892689" cy="413509"/>
           </a:xfrm>
           <a:prstGeom prst="rect">
@@ -5124,7 +5124,7 @@
         </p:nvSpPr>
         <p:spPr>
           <a:xfrm>
-            <a:off x="5272114" y="1587222"/>
+            <a:off x="2370652" y="2176307"/>
             <a:ext cx="1958419" cy="353545"/>
           </a:xfrm>
           <a:prstGeom prst="rect">
@@ -5176,7 +5176,7 @@
         </p:nvSpPr>
         <p:spPr>
           <a:xfrm>
-            <a:off x="4718340" y="1255982"/>
+            <a:off x="1816878" y="1845067"/>
             <a:ext cx="914400" cy="369332"/>
           </a:xfrm>
           <a:prstGeom prst="rect">
@@ -5215,7 +5215,7 @@
         </p:nvSpPr>
         <p:spPr>
           <a:xfrm>
-            <a:off x="5990241" y="1151597"/>
+            <a:off x="3088779" y="1740682"/>
             <a:ext cx="565549" cy="369332"/>
           </a:xfrm>
           <a:prstGeom prst="rect">
@@ -5238,6 +5238,1056 @@
               <a:t>⑭</a:t>
             </a:r>
             <a:endParaRPr lang="ko-KR" altLang="en-US" dirty="0"/>
+          </a:p>
+        </p:txBody>
+      </p:sp>
+      <p:pic>
+        <p:nvPicPr>
+          <p:cNvPr id="4" name="그림 3">
+            <a:extLst>
+              <a:ext uri="{FF2B5EF4-FFF2-40B4-BE49-F238E27FC236}">
+                <a16:creationId xmlns:a16="http://schemas.microsoft.com/office/drawing/2014/main" id="{1DE9DFC1-0869-B5DF-630A-408DF2BB232A}"/>
+              </a:ext>
+            </a:extLst>
+          </p:cNvPr>
+          <p:cNvPicPr>
+            <a:picLocks noChangeAspect="1"/>
+          </p:cNvPicPr>
+          <p:nvPr/>
+        </p:nvPicPr>
+        <p:blipFill>
+          <a:blip r:embed="rId4"/>
+          <a:stretch>
+            <a:fillRect/>
+          </a:stretch>
+        </p:blipFill>
+        <p:spPr>
+          <a:xfrm>
+            <a:off x="6424779" y="1452429"/>
+            <a:ext cx="3970829" cy="4392639"/>
+          </a:xfrm>
+          <a:prstGeom prst="rect">
+            <a:avLst/>
+          </a:prstGeom>
+        </p:spPr>
+      </p:pic>
+      <p:sp>
+        <p:nvSpPr>
+          <p:cNvPr id="62" name="TextBox 61">
+            <a:extLst>
+              <a:ext uri="{FF2B5EF4-FFF2-40B4-BE49-F238E27FC236}">
+                <a16:creationId xmlns:a16="http://schemas.microsoft.com/office/drawing/2014/main" id="{4A5F7EBA-EA7C-2D4F-28F5-2D672B1275E2}"/>
+              </a:ext>
+            </a:extLst>
+          </p:cNvPr>
+          <p:cNvSpPr txBox="1"/>
+          <p:nvPr/>
+        </p:nvSpPr>
+        <p:spPr>
+          <a:xfrm>
+            <a:off x="9788484" y="2222569"/>
+            <a:ext cx="528984" cy="923330"/>
+          </a:xfrm>
+          <a:prstGeom prst="rect">
+            <a:avLst/>
+          </a:prstGeom>
+          <a:noFill/>
+        </p:spPr>
+        <p:txBody>
+          <a:bodyPr wrap="square" rtlCol="0">
+            <a:spAutoFit/>
+          </a:bodyPr>
+          <a:lstStyle/>
+          <a:p>
+            <a:r>
+              <a:rPr lang="ko-KR" altLang="en-US" b="1" dirty="0">
+                <a:solidFill>
+                  <a:srgbClr val="FF0000"/>
+                </a:solidFill>
+              </a:rPr>
+              <a:t>③</a:t>
+            </a:r>
+          </a:p>
+          <a:p>
+            <a:endParaRPr lang="en-US" altLang="ko-KR" b="1" dirty="0">
+              <a:solidFill>
+                <a:srgbClr val="FF0000"/>
+              </a:solidFill>
+            </a:endParaRPr>
+          </a:p>
+          <a:p>
+            <a:r>
+              <a:rPr lang="ko-KR" altLang="en-US" b="1" dirty="0">
+                <a:solidFill>
+                  <a:srgbClr val="FF0000"/>
+                </a:solidFill>
+              </a:rPr>
+              <a:t>⑦</a:t>
+            </a:r>
+            <a:endParaRPr lang="ko-KR" altLang="en-US" dirty="0"/>
+          </a:p>
+        </p:txBody>
+      </p:sp>
+      <p:sp>
+        <p:nvSpPr>
+          <p:cNvPr id="63" name="TextBox 62">
+            <a:extLst>
+              <a:ext uri="{FF2B5EF4-FFF2-40B4-BE49-F238E27FC236}">
+                <a16:creationId xmlns:a16="http://schemas.microsoft.com/office/drawing/2014/main" id="{1228F69B-B414-BC0D-615A-2CD386457055}"/>
+              </a:ext>
+            </a:extLst>
+          </p:cNvPr>
+          <p:cNvSpPr txBox="1"/>
+          <p:nvPr/>
+        </p:nvSpPr>
+        <p:spPr>
+          <a:xfrm>
+            <a:off x="6867483" y="3369593"/>
+            <a:ext cx="1011441" cy="369332"/>
+          </a:xfrm>
+          <a:prstGeom prst="rect">
+            <a:avLst/>
+          </a:prstGeom>
+          <a:noFill/>
+        </p:spPr>
+        <p:txBody>
+          <a:bodyPr wrap="square">
+            <a:spAutoFit/>
+          </a:bodyPr>
+          <a:lstStyle/>
+          <a:p>
+            <a:r>
+              <a:rPr lang="ko-KR" altLang="en-US" b="1" dirty="0">
+                <a:solidFill>
+                  <a:srgbClr val="FF0000"/>
+                </a:solidFill>
+              </a:rPr>
+              <a:t>②</a:t>
+            </a:r>
+            <a:endParaRPr lang="ko-KR" altLang="en-US" dirty="0"/>
+          </a:p>
+        </p:txBody>
+      </p:sp>
+      <p:sp>
+        <p:nvSpPr>
+          <p:cNvPr id="64" name="TextBox 63">
+            <a:extLst>
+              <a:ext uri="{FF2B5EF4-FFF2-40B4-BE49-F238E27FC236}">
+                <a16:creationId xmlns:a16="http://schemas.microsoft.com/office/drawing/2014/main" id="{73424739-CB6C-E377-7402-22ED2CF67821}"/>
+              </a:ext>
+            </a:extLst>
+          </p:cNvPr>
+          <p:cNvSpPr txBox="1"/>
+          <p:nvPr/>
+        </p:nvSpPr>
+        <p:spPr>
+          <a:xfrm>
+            <a:off x="9619065" y="3130995"/>
+            <a:ext cx="916335" cy="369332"/>
+          </a:xfrm>
+          <a:prstGeom prst="rect">
+            <a:avLst/>
+          </a:prstGeom>
+          <a:noFill/>
+        </p:spPr>
+        <p:txBody>
+          <a:bodyPr wrap="square">
+            <a:spAutoFit/>
+          </a:bodyPr>
+          <a:lstStyle/>
+          <a:p>
+            <a:r>
+              <a:rPr lang="ko-KR" altLang="en-US" b="1" dirty="0">
+                <a:solidFill>
+                  <a:srgbClr val="FF0000"/>
+                </a:solidFill>
+              </a:rPr>
+              <a:t>⑥</a:t>
+            </a:r>
+            <a:endParaRPr lang="ko-KR" altLang="en-US" dirty="0"/>
+          </a:p>
+        </p:txBody>
+      </p:sp>
+      <p:sp>
+        <p:nvSpPr>
+          <p:cNvPr id="65" name="TextBox 64">
+            <a:extLst>
+              <a:ext uri="{FF2B5EF4-FFF2-40B4-BE49-F238E27FC236}">
+                <a16:creationId xmlns:a16="http://schemas.microsoft.com/office/drawing/2014/main" id="{65B7CDC6-B4EC-41CF-5BBB-9712107E4004}"/>
+              </a:ext>
+            </a:extLst>
+          </p:cNvPr>
+          <p:cNvSpPr txBox="1"/>
+          <p:nvPr/>
+        </p:nvSpPr>
+        <p:spPr>
+          <a:xfrm>
+            <a:off x="9805417" y="2947501"/>
+            <a:ext cx="512052" cy="369332"/>
+          </a:xfrm>
+          <a:prstGeom prst="rect">
+            <a:avLst/>
+          </a:prstGeom>
+          <a:noFill/>
+        </p:spPr>
+        <p:txBody>
+          <a:bodyPr wrap="square">
+            <a:spAutoFit/>
+          </a:bodyPr>
+          <a:lstStyle/>
+          <a:p>
+            <a:r>
+              <a:rPr lang="ko-KR" altLang="en-US" b="1" dirty="0">
+                <a:solidFill>
+                  <a:srgbClr val="FF0000"/>
+                </a:solidFill>
+              </a:rPr>
+              <a:t>⑤</a:t>
+            </a:r>
+            <a:endParaRPr lang="ko-KR" altLang="en-US" dirty="0"/>
+          </a:p>
+        </p:txBody>
+      </p:sp>
+      <p:sp>
+        <p:nvSpPr>
+          <p:cNvPr id="66" name="TextBox 65">
+            <a:extLst>
+              <a:ext uri="{FF2B5EF4-FFF2-40B4-BE49-F238E27FC236}">
+                <a16:creationId xmlns:a16="http://schemas.microsoft.com/office/drawing/2014/main" id="{37680DA8-165F-0821-08BE-9206F609228E}"/>
+              </a:ext>
+            </a:extLst>
+          </p:cNvPr>
+          <p:cNvSpPr txBox="1"/>
+          <p:nvPr/>
+        </p:nvSpPr>
+        <p:spPr>
+          <a:xfrm>
+            <a:off x="9295300" y="3554163"/>
+            <a:ext cx="837478" cy="369332"/>
+          </a:xfrm>
+          <a:prstGeom prst="rect">
+            <a:avLst/>
+          </a:prstGeom>
+          <a:noFill/>
+        </p:spPr>
+        <p:txBody>
+          <a:bodyPr wrap="square">
+            <a:spAutoFit/>
+          </a:bodyPr>
+          <a:lstStyle/>
+          <a:p>
+            <a:r>
+              <a:rPr lang="ko-KR" altLang="en-US" b="1" dirty="0">
+                <a:solidFill>
+                  <a:srgbClr val="FF0000"/>
+                </a:solidFill>
+              </a:rPr>
+              <a:t>⑧</a:t>
+            </a:r>
+            <a:endParaRPr lang="ko-KR" altLang="en-US" dirty="0"/>
+          </a:p>
+        </p:txBody>
+      </p:sp>
+      <p:sp>
+        <p:nvSpPr>
+          <p:cNvPr id="67" name="TextBox 66">
+            <a:extLst>
+              <a:ext uri="{FF2B5EF4-FFF2-40B4-BE49-F238E27FC236}">
+                <a16:creationId xmlns:a16="http://schemas.microsoft.com/office/drawing/2014/main" id="{038543AC-7342-1A2C-AE17-97A07A50CE90}"/>
+              </a:ext>
+            </a:extLst>
+          </p:cNvPr>
+          <p:cNvSpPr txBox="1"/>
+          <p:nvPr/>
+        </p:nvSpPr>
+        <p:spPr>
+          <a:xfrm>
+            <a:off x="8249669" y="3552457"/>
+            <a:ext cx="766046" cy="369332"/>
+          </a:xfrm>
+          <a:prstGeom prst="rect">
+            <a:avLst/>
+          </a:prstGeom>
+          <a:noFill/>
+        </p:spPr>
+        <p:txBody>
+          <a:bodyPr wrap="square">
+            <a:spAutoFit/>
+          </a:bodyPr>
+          <a:lstStyle/>
+          <a:p>
+            <a:r>
+              <a:rPr lang="ko-KR" altLang="en-US" b="1" dirty="0">
+                <a:solidFill>
+                  <a:srgbClr val="FF0000"/>
+                </a:solidFill>
+              </a:rPr>
+              <a:t>④</a:t>
+            </a:r>
+            <a:endParaRPr lang="ko-KR" altLang="en-US" dirty="0"/>
+          </a:p>
+        </p:txBody>
+      </p:sp>
+      <p:sp>
+        <p:nvSpPr>
+          <p:cNvPr id="68" name="TextBox 67">
+            <a:extLst>
+              <a:ext uri="{FF2B5EF4-FFF2-40B4-BE49-F238E27FC236}">
+                <a16:creationId xmlns:a16="http://schemas.microsoft.com/office/drawing/2014/main" id="{C0C651ED-F7EE-04E8-A0F2-07DC409CBB5F}"/>
+              </a:ext>
+            </a:extLst>
+          </p:cNvPr>
+          <p:cNvSpPr txBox="1"/>
+          <p:nvPr/>
+        </p:nvSpPr>
+        <p:spPr>
+          <a:xfrm>
+            <a:off x="8704750" y="3123211"/>
+            <a:ext cx="690215" cy="369332"/>
+          </a:xfrm>
+          <a:prstGeom prst="rect">
+            <a:avLst/>
+          </a:prstGeom>
+          <a:noFill/>
+        </p:spPr>
+        <p:txBody>
+          <a:bodyPr wrap="square">
+            <a:spAutoFit/>
+          </a:bodyPr>
+          <a:lstStyle/>
+          <a:p>
+            <a:r>
+              <a:rPr lang="ko-KR" altLang="en-US" b="1" dirty="0">
+                <a:solidFill>
+                  <a:srgbClr val="FF0000"/>
+                </a:solidFill>
+              </a:rPr>
+              <a:t>⑨</a:t>
+            </a:r>
+            <a:endParaRPr lang="ko-KR" altLang="en-US" dirty="0"/>
+          </a:p>
+        </p:txBody>
+      </p:sp>
+      <p:sp>
+        <p:nvSpPr>
+          <p:cNvPr id="69" name="TextBox 68">
+            <a:extLst>
+              <a:ext uri="{FF2B5EF4-FFF2-40B4-BE49-F238E27FC236}">
+                <a16:creationId xmlns:a16="http://schemas.microsoft.com/office/drawing/2014/main" id="{864501ED-AD1C-0BBF-3407-45AB95D83373}"/>
+              </a:ext>
+            </a:extLst>
+          </p:cNvPr>
+          <p:cNvSpPr txBox="1"/>
+          <p:nvPr/>
+        </p:nvSpPr>
+        <p:spPr>
+          <a:xfrm>
+            <a:off x="6161964" y="3814435"/>
+            <a:ext cx="3280421" cy="369332"/>
+          </a:xfrm>
+          <a:prstGeom prst="rect">
+            <a:avLst/>
+          </a:prstGeom>
+          <a:noFill/>
+        </p:spPr>
+        <p:txBody>
+          <a:bodyPr wrap="square">
+            <a:spAutoFit/>
+          </a:bodyPr>
+          <a:lstStyle/>
+          <a:p>
+            <a:r>
+              <a:rPr lang="ko-KR" altLang="en-US" b="1" dirty="0">
+                <a:solidFill>
+                  <a:srgbClr val="FF0000"/>
+                </a:solidFill>
+              </a:rPr>
+              <a:t>⑩</a:t>
+            </a:r>
+            <a:endParaRPr lang="ko-KR" altLang="en-US" dirty="0"/>
+          </a:p>
+        </p:txBody>
+      </p:sp>
+      <p:sp>
+        <p:nvSpPr>
+          <p:cNvPr id="70" name="직사각형 69">
+            <a:extLst>
+              <a:ext uri="{FF2B5EF4-FFF2-40B4-BE49-F238E27FC236}">
+                <a16:creationId xmlns:a16="http://schemas.microsoft.com/office/drawing/2014/main" id="{8583974F-7171-B863-08AA-D9045B942DED}"/>
+              </a:ext>
+            </a:extLst>
+          </p:cNvPr>
+          <p:cNvSpPr/>
+          <p:nvPr/>
+        </p:nvSpPr>
+        <p:spPr>
+          <a:xfrm>
+            <a:off x="7957064" y="2543899"/>
+            <a:ext cx="1958419" cy="444606"/>
+          </a:xfrm>
+          <a:prstGeom prst="rect">
+            <a:avLst/>
+          </a:prstGeom>
+          <a:noFill/>
+          <a:ln>
+            <a:solidFill>
+              <a:srgbClr val="FF0000"/>
+            </a:solidFill>
+          </a:ln>
+        </p:spPr>
+        <p:style>
+          <a:lnRef idx="2">
+            <a:schemeClr val="accent1">
+              <a:shade val="50000"/>
+            </a:schemeClr>
+          </a:lnRef>
+          <a:fillRef idx="1">
+            <a:schemeClr val="accent1"/>
+          </a:fillRef>
+          <a:effectRef idx="0">
+            <a:schemeClr val="accent1"/>
+          </a:effectRef>
+          <a:fontRef idx="minor">
+            <a:schemeClr val="lt1"/>
+          </a:fontRef>
+        </p:style>
+        <p:txBody>
+          <a:bodyPr rtlCol="0" anchor="ctr"/>
+          <a:lstStyle/>
+          <a:p>
+            <a:pPr algn="ctr"/>
+            <a:endParaRPr lang="ko-KR" altLang="en-US"/>
+          </a:p>
+        </p:txBody>
+      </p:sp>
+      <p:sp>
+        <p:nvSpPr>
+          <p:cNvPr id="71" name="직사각형 70">
+            <a:extLst>
+              <a:ext uri="{FF2B5EF4-FFF2-40B4-BE49-F238E27FC236}">
+                <a16:creationId xmlns:a16="http://schemas.microsoft.com/office/drawing/2014/main" id="{91966A7D-AE1B-A965-B8B0-3D802FD1F386}"/>
+              </a:ext>
+            </a:extLst>
+          </p:cNvPr>
+          <p:cNvSpPr/>
+          <p:nvPr/>
+        </p:nvSpPr>
+        <p:spPr>
+          <a:xfrm>
+            <a:off x="6418022" y="2294017"/>
+            <a:ext cx="1321530" cy="1390133"/>
+          </a:xfrm>
+          <a:prstGeom prst="rect">
+            <a:avLst/>
+          </a:prstGeom>
+          <a:noFill/>
+          <a:ln>
+            <a:solidFill>
+              <a:srgbClr val="FF0000"/>
+            </a:solidFill>
+          </a:ln>
+        </p:spPr>
+        <p:style>
+          <a:lnRef idx="2">
+            <a:schemeClr val="accent1">
+              <a:shade val="50000"/>
+            </a:schemeClr>
+          </a:lnRef>
+          <a:fillRef idx="1">
+            <a:schemeClr val="accent1"/>
+          </a:fillRef>
+          <a:effectRef idx="0">
+            <a:schemeClr val="accent1"/>
+          </a:effectRef>
+          <a:fontRef idx="minor">
+            <a:schemeClr val="lt1"/>
+          </a:fontRef>
+        </p:style>
+        <p:txBody>
+          <a:bodyPr rtlCol="0" anchor="ctr"/>
+          <a:lstStyle/>
+          <a:p>
+            <a:pPr algn="ctr"/>
+            <a:endParaRPr lang="ko-KR" altLang="en-US"/>
+          </a:p>
+        </p:txBody>
+      </p:sp>
+      <p:sp>
+        <p:nvSpPr>
+          <p:cNvPr id="72" name="직사각형 71">
+            <a:extLst>
+              <a:ext uri="{FF2B5EF4-FFF2-40B4-BE49-F238E27FC236}">
+                <a16:creationId xmlns:a16="http://schemas.microsoft.com/office/drawing/2014/main" id="{8AF1D716-BD50-3695-1CF5-AF9DDB08C19F}"/>
+              </a:ext>
+            </a:extLst>
+          </p:cNvPr>
+          <p:cNvSpPr/>
+          <p:nvPr/>
+        </p:nvSpPr>
+        <p:spPr>
+          <a:xfrm>
+            <a:off x="7973770" y="3029887"/>
+            <a:ext cx="1933246" cy="185965"/>
+          </a:xfrm>
+          <a:prstGeom prst="rect">
+            <a:avLst/>
+          </a:prstGeom>
+          <a:noFill/>
+          <a:ln>
+            <a:solidFill>
+              <a:srgbClr val="FF0000"/>
+            </a:solidFill>
+          </a:ln>
+        </p:spPr>
+        <p:style>
+          <a:lnRef idx="2">
+            <a:schemeClr val="accent1">
+              <a:shade val="50000"/>
+            </a:schemeClr>
+          </a:lnRef>
+          <a:fillRef idx="1">
+            <a:schemeClr val="accent1"/>
+          </a:fillRef>
+          <a:effectRef idx="0">
+            <a:schemeClr val="accent1"/>
+          </a:effectRef>
+          <a:fontRef idx="minor">
+            <a:schemeClr val="lt1"/>
+          </a:fontRef>
+        </p:style>
+        <p:txBody>
+          <a:bodyPr rtlCol="0" anchor="ctr"/>
+          <a:lstStyle/>
+          <a:p>
+            <a:pPr algn="ctr"/>
+            <a:endParaRPr lang="ko-KR" altLang="en-US"/>
+          </a:p>
+        </p:txBody>
+      </p:sp>
+      <p:sp>
+        <p:nvSpPr>
+          <p:cNvPr id="73" name="직사각형 72">
+            <a:extLst>
+              <a:ext uri="{FF2B5EF4-FFF2-40B4-BE49-F238E27FC236}">
+                <a16:creationId xmlns:a16="http://schemas.microsoft.com/office/drawing/2014/main" id="{B5327773-6726-0E30-A60A-D23597A98661}"/>
+              </a:ext>
+            </a:extLst>
+          </p:cNvPr>
+          <p:cNvSpPr/>
+          <p:nvPr/>
+        </p:nvSpPr>
+        <p:spPr>
+          <a:xfrm>
+            <a:off x="6474722" y="3905333"/>
+            <a:ext cx="2407828" cy="390799"/>
+          </a:xfrm>
+          <a:prstGeom prst="rect">
+            <a:avLst/>
+          </a:prstGeom>
+          <a:noFill/>
+          <a:ln>
+            <a:solidFill>
+              <a:srgbClr val="FF0000"/>
+            </a:solidFill>
+          </a:ln>
+        </p:spPr>
+        <p:style>
+          <a:lnRef idx="2">
+            <a:schemeClr val="accent1">
+              <a:shade val="50000"/>
+            </a:schemeClr>
+          </a:lnRef>
+          <a:fillRef idx="1">
+            <a:schemeClr val="accent1"/>
+          </a:fillRef>
+          <a:effectRef idx="0">
+            <a:schemeClr val="accent1"/>
+          </a:effectRef>
+          <a:fontRef idx="minor">
+            <a:schemeClr val="lt1"/>
+          </a:fontRef>
+        </p:style>
+        <p:txBody>
+          <a:bodyPr rtlCol="0" anchor="ctr"/>
+          <a:lstStyle/>
+          <a:p>
+            <a:pPr algn="ctr"/>
+            <a:endParaRPr lang="ko-KR" altLang="en-US"/>
+          </a:p>
+        </p:txBody>
+      </p:sp>
+      <p:sp>
+        <p:nvSpPr>
+          <p:cNvPr id="74" name="TextBox 73">
+            <a:extLst>
+              <a:ext uri="{FF2B5EF4-FFF2-40B4-BE49-F238E27FC236}">
+                <a16:creationId xmlns:a16="http://schemas.microsoft.com/office/drawing/2014/main" id="{A5409989-813A-577D-DFB8-035D831F2A1D}"/>
+              </a:ext>
+            </a:extLst>
+          </p:cNvPr>
+          <p:cNvSpPr txBox="1"/>
+          <p:nvPr/>
+        </p:nvSpPr>
+        <p:spPr>
+          <a:xfrm>
+            <a:off x="9816336" y="1390805"/>
+            <a:ext cx="632883" cy="369332"/>
+          </a:xfrm>
+          <a:prstGeom prst="rect">
+            <a:avLst/>
+          </a:prstGeom>
+          <a:noFill/>
+        </p:spPr>
+        <p:txBody>
+          <a:bodyPr wrap="square">
+            <a:spAutoFit/>
+          </a:bodyPr>
+          <a:lstStyle/>
+          <a:p>
+            <a:r>
+              <a:rPr lang="ko-KR" altLang="en-US" b="1" dirty="0">
+                <a:solidFill>
+                  <a:srgbClr val="FF0000"/>
+                </a:solidFill>
+              </a:rPr>
+              <a:t>⑪</a:t>
+            </a:r>
+            <a:endParaRPr lang="ko-KR" altLang="en-US" dirty="0"/>
+          </a:p>
+        </p:txBody>
+      </p:sp>
+      <p:sp>
+        <p:nvSpPr>
+          <p:cNvPr id="75" name="TextBox 74">
+            <a:extLst>
+              <a:ext uri="{FF2B5EF4-FFF2-40B4-BE49-F238E27FC236}">
+                <a16:creationId xmlns:a16="http://schemas.microsoft.com/office/drawing/2014/main" id="{4245A8C5-D834-8BB9-8816-D701F27FEA8A}"/>
+              </a:ext>
+            </a:extLst>
+          </p:cNvPr>
+          <p:cNvSpPr txBox="1"/>
+          <p:nvPr/>
+        </p:nvSpPr>
+        <p:spPr>
+          <a:xfrm>
+            <a:off x="10001713" y="1892740"/>
+            <a:ext cx="447506" cy="369332"/>
+          </a:xfrm>
+          <a:prstGeom prst="rect">
+            <a:avLst/>
+          </a:prstGeom>
+          <a:noFill/>
+        </p:spPr>
+        <p:txBody>
+          <a:bodyPr wrap="square">
+            <a:spAutoFit/>
+          </a:bodyPr>
+          <a:lstStyle/>
+          <a:p>
+            <a:r>
+              <a:rPr lang="ko-KR" altLang="en-US" b="1" dirty="0">
+                <a:solidFill>
+                  <a:srgbClr val="FF0000"/>
+                </a:solidFill>
+              </a:rPr>
+              <a:t>⑫</a:t>
+            </a:r>
+            <a:endParaRPr lang="ko-KR" altLang="en-US" dirty="0"/>
+          </a:p>
+        </p:txBody>
+      </p:sp>
+      <p:sp>
+        <p:nvSpPr>
+          <p:cNvPr id="76" name="TextBox 75">
+            <a:extLst>
+              <a:ext uri="{FF2B5EF4-FFF2-40B4-BE49-F238E27FC236}">
+                <a16:creationId xmlns:a16="http://schemas.microsoft.com/office/drawing/2014/main" id="{87EEAE5F-7EF8-FCC6-3F80-08859302A2AC}"/>
+              </a:ext>
+            </a:extLst>
+          </p:cNvPr>
+          <p:cNvSpPr txBox="1"/>
+          <p:nvPr/>
+        </p:nvSpPr>
+        <p:spPr>
+          <a:xfrm>
+            <a:off x="6430271" y="5456370"/>
+            <a:ext cx="4150012" cy="369332"/>
+          </a:xfrm>
+          <a:prstGeom prst="rect">
+            <a:avLst/>
+          </a:prstGeom>
+          <a:noFill/>
+        </p:spPr>
+        <p:txBody>
+          <a:bodyPr wrap="square">
+            <a:spAutoFit/>
+          </a:bodyPr>
+          <a:lstStyle/>
+          <a:p>
+            <a:r>
+              <a:rPr lang="ko-KR" altLang="en-US" b="1" dirty="0">
+                <a:solidFill>
+                  <a:srgbClr val="FF0000"/>
+                </a:solidFill>
+              </a:rPr>
+              <a:t>⑬</a:t>
+            </a:r>
+            <a:endParaRPr lang="ko-KR" altLang="en-US" dirty="0"/>
+          </a:p>
+        </p:txBody>
+      </p:sp>
+      <p:sp>
+        <p:nvSpPr>
+          <p:cNvPr id="77" name="직사각형 76">
+            <a:extLst>
+              <a:ext uri="{FF2B5EF4-FFF2-40B4-BE49-F238E27FC236}">
+                <a16:creationId xmlns:a16="http://schemas.microsoft.com/office/drawing/2014/main" id="{552ACC76-457E-65E6-FC5A-1395BD97D7C7}"/>
+              </a:ext>
+            </a:extLst>
+          </p:cNvPr>
+          <p:cNvSpPr/>
+          <p:nvPr/>
+        </p:nvSpPr>
+        <p:spPr>
+          <a:xfrm>
+            <a:off x="6464814" y="4303305"/>
+            <a:ext cx="3890038" cy="1441393"/>
+          </a:xfrm>
+          <a:prstGeom prst="rect">
+            <a:avLst/>
+          </a:prstGeom>
+          <a:noFill/>
+          <a:ln>
+            <a:solidFill>
+              <a:srgbClr val="FF0000"/>
+            </a:solidFill>
+          </a:ln>
+        </p:spPr>
+        <p:style>
+          <a:lnRef idx="2">
+            <a:schemeClr val="accent1">
+              <a:shade val="50000"/>
+            </a:schemeClr>
+          </a:lnRef>
+          <a:fillRef idx="1">
+            <a:schemeClr val="accent1"/>
+          </a:fillRef>
+          <a:effectRef idx="0">
+            <a:schemeClr val="accent1"/>
+          </a:effectRef>
+          <a:fontRef idx="minor">
+            <a:schemeClr val="lt1"/>
+          </a:fontRef>
+        </p:style>
+        <p:txBody>
+          <a:bodyPr rtlCol="0" anchor="ctr"/>
+          <a:lstStyle/>
+          <a:p>
+            <a:pPr algn="ctr"/>
+            <a:endParaRPr lang="ko-KR" altLang="en-US"/>
+          </a:p>
+        </p:txBody>
+      </p:sp>
+      <p:sp>
+        <p:nvSpPr>
+          <p:cNvPr id="79" name="직사각형 78">
+            <a:extLst>
+              <a:ext uri="{FF2B5EF4-FFF2-40B4-BE49-F238E27FC236}">
+                <a16:creationId xmlns:a16="http://schemas.microsoft.com/office/drawing/2014/main" id="{07190936-1564-CD00-A9FA-FF8A8A7E7B8B}"/>
+              </a:ext>
+            </a:extLst>
+          </p:cNvPr>
+          <p:cNvSpPr/>
+          <p:nvPr/>
+        </p:nvSpPr>
+        <p:spPr>
+          <a:xfrm>
+            <a:off x="7948597" y="2177479"/>
+            <a:ext cx="1958419" cy="353545"/>
+          </a:xfrm>
+          <a:prstGeom prst="rect">
+            <a:avLst/>
+          </a:prstGeom>
+          <a:noFill/>
+          <a:ln>
+            <a:solidFill>
+              <a:srgbClr val="FF0000"/>
+            </a:solidFill>
+          </a:ln>
+        </p:spPr>
+        <p:style>
+          <a:lnRef idx="2">
+            <a:schemeClr val="accent1">
+              <a:shade val="50000"/>
+            </a:schemeClr>
+          </a:lnRef>
+          <a:fillRef idx="1">
+            <a:schemeClr val="accent1"/>
+          </a:fillRef>
+          <a:effectRef idx="0">
+            <a:schemeClr val="accent1"/>
+          </a:effectRef>
+          <a:fontRef idx="minor">
+            <a:schemeClr val="lt1"/>
+          </a:fontRef>
+        </p:style>
+        <p:txBody>
+          <a:bodyPr rtlCol="0" anchor="ctr"/>
+          <a:lstStyle/>
+          <a:p>
+            <a:pPr algn="ctr"/>
+            <a:endParaRPr lang="ko-KR" altLang="en-US"/>
+          </a:p>
+        </p:txBody>
+      </p:sp>
+      <p:sp>
+        <p:nvSpPr>
+          <p:cNvPr id="80" name="TextBox 79">
+            <a:extLst>
+              <a:ext uri="{FF2B5EF4-FFF2-40B4-BE49-F238E27FC236}">
+                <a16:creationId xmlns:a16="http://schemas.microsoft.com/office/drawing/2014/main" id="{E4BD91DE-2C2D-19E7-2C8C-507BEEF8FF2A}"/>
+              </a:ext>
+            </a:extLst>
+          </p:cNvPr>
+          <p:cNvSpPr txBox="1"/>
+          <p:nvPr/>
+        </p:nvSpPr>
+        <p:spPr>
+          <a:xfrm>
+            <a:off x="7394823" y="1503345"/>
+            <a:ext cx="914400" cy="369332"/>
+          </a:xfrm>
+          <a:prstGeom prst="rect">
+            <a:avLst/>
+          </a:prstGeom>
+          <a:noFill/>
+        </p:spPr>
+        <p:txBody>
+          <a:bodyPr wrap="square" rtlCol="0">
+            <a:spAutoFit/>
+          </a:bodyPr>
+          <a:lstStyle/>
+          <a:p>
+            <a:r>
+              <a:rPr lang="ko-KR" altLang="en-US" b="1" dirty="0">
+                <a:solidFill>
+                  <a:srgbClr val="FF0000"/>
+                </a:solidFill>
+              </a:rPr>
+              <a:t>①</a:t>
+            </a:r>
+          </a:p>
+        </p:txBody>
+      </p:sp>
+      <p:sp>
+        <p:nvSpPr>
+          <p:cNvPr id="81" name="TextBox 80">
+            <a:extLst>
+              <a:ext uri="{FF2B5EF4-FFF2-40B4-BE49-F238E27FC236}">
+                <a16:creationId xmlns:a16="http://schemas.microsoft.com/office/drawing/2014/main" id="{9B774863-6B64-2988-A71C-3211C51B0AAA}"/>
+              </a:ext>
+            </a:extLst>
+          </p:cNvPr>
+          <p:cNvSpPr txBox="1"/>
+          <p:nvPr/>
+        </p:nvSpPr>
+        <p:spPr>
+          <a:xfrm>
+            <a:off x="8640348" y="1442920"/>
+            <a:ext cx="565549" cy="369332"/>
+          </a:xfrm>
+          <a:prstGeom prst="rect">
+            <a:avLst/>
+          </a:prstGeom>
+          <a:noFill/>
+        </p:spPr>
+        <p:txBody>
+          <a:bodyPr wrap="square">
+            <a:spAutoFit/>
+          </a:bodyPr>
+          <a:lstStyle/>
+          <a:p>
+            <a:r>
+              <a:rPr lang="ko-KR" altLang="en-US" b="1" dirty="0">
+                <a:solidFill>
+                  <a:srgbClr val="FF0000"/>
+                </a:solidFill>
+              </a:rPr>
+              <a:t>⑭</a:t>
+            </a:r>
+            <a:endParaRPr lang="ko-KR" altLang="en-US" dirty="0"/>
+          </a:p>
+        </p:txBody>
+      </p:sp>
+      <p:sp>
+        <p:nvSpPr>
+          <p:cNvPr id="82" name="TextBox 81">
+            <a:extLst>
+              <a:ext uri="{FF2B5EF4-FFF2-40B4-BE49-F238E27FC236}">
+                <a16:creationId xmlns:a16="http://schemas.microsoft.com/office/drawing/2014/main" id="{4376ACA7-15A5-9001-05DB-C30ED182C664}"/>
+              </a:ext>
+            </a:extLst>
+          </p:cNvPr>
+          <p:cNvSpPr txBox="1"/>
+          <p:nvPr/>
+        </p:nvSpPr>
+        <p:spPr>
+          <a:xfrm>
+            <a:off x="6320414" y="1760109"/>
+            <a:ext cx="603050" cy="369332"/>
+          </a:xfrm>
+          <a:prstGeom prst="rect">
+            <a:avLst/>
+          </a:prstGeom>
+          <a:noFill/>
+        </p:spPr>
+        <p:txBody>
+          <a:bodyPr wrap="square">
+            <a:spAutoFit/>
+          </a:bodyPr>
+          <a:lstStyle/>
+          <a:p>
+            <a:r>
+              <a:rPr lang="ko-KR" altLang="en-US" b="1" dirty="0">
+                <a:solidFill>
+                  <a:srgbClr val="FF0000"/>
+                </a:solidFill>
+              </a:rPr>
+              <a:t>⑮</a:t>
+            </a:r>
+            <a:endParaRPr lang="ko-KR" altLang="en-US" dirty="0"/>
+          </a:p>
+        </p:txBody>
+      </p:sp>
+      <p:sp>
+        <p:nvSpPr>
+          <p:cNvPr id="83" name="TextBox 82">
+            <a:extLst>
+              <a:ext uri="{FF2B5EF4-FFF2-40B4-BE49-F238E27FC236}">
+                <a16:creationId xmlns:a16="http://schemas.microsoft.com/office/drawing/2014/main" id="{F7F6FFBA-724F-2611-ACC8-A9AE0B57BFFA}"/>
+              </a:ext>
+            </a:extLst>
+          </p:cNvPr>
+          <p:cNvSpPr txBox="1"/>
+          <p:nvPr/>
+        </p:nvSpPr>
+        <p:spPr>
+          <a:xfrm>
+            <a:off x="3934015" y="693907"/>
+            <a:ext cx="6097464" cy="369332"/>
+          </a:xfrm>
+          <a:prstGeom prst="rect">
+            <a:avLst/>
+          </a:prstGeom>
+          <a:noFill/>
+        </p:spPr>
+        <p:txBody>
+          <a:bodyPr wrap="square">
+            <a:spAutoFit/>
+          </a:bodyPr>
+          <a:lstStyle/>
+          <a:p>
+            <a:r>
+              <a:rPr lang="ko-KR" altLang="en-US" b="1" dirty="0">
+                <a:solidFill>
+                  <a:srgbClr val="FF0000"/>
+                </a:solidFill>
+              </a:rPr>
+              <a:t>⑮</a:t>
+            </a:r>
+            <a:r>
+              <a:rPr lang="en-US" altLang="ko-KR" sz="1400" b="1" dirty="0">
+                <a:solidFill>
+                  <a:srgbClr val="FF0000"/>
+                </a:solidFill>
+              </a:rPr>
+              <a:t>(16)</a:t>
+            </a:r>
+            <a:endParaRPr lang="ko-KR" altLang="en-US" b="1" dirty="0">
+              <a:solidFill>
+                <a:srgbClr val="FF0000"/>
+              </a:solidFill>
+            </a:endParaRPr>
+          </a:p>
+        </p:txBody>
+      </p:sp>
+      <p:sp>
+        <p:nvSpPr>
+          <p:cNvPr id="84" name="TextBox 83">
+            <a:extLst>
+              <a:ext uri="{FF2B5EF4-FFF2-40B4-BE49-F238E27FC236}">
+                <a16:creationId xmlns:a16="http://schemas.microsoft.com/office/drawing/2014/main" id="{097B2F80-3595-4D3E-D8B7-70E3CE943187}"/>
+              </a:ext>
+            </a:extLst>
+          </p:cNvPr>
+          <p:cNvSpPr txBox="1"/>
+          <p:nvPr/>
+        </p:nvSpPr>
+        <p:spPr>
+          <a:xfrm>
+            <a:off x="8608720" y="1786848"/>
+            <a:ext cx="1080921" cy="276999"/>
+          </a:xfrm>
+          <a:prstGeom prst="rect">
+            <a:avLst/>
+          </a:prstGeom>
+          <a:noFill/>
+        </p:spPr>
+        <p:txBody>
+          <a:bodyPr wrap="square">
+            <a:spAutoFit/>
+          </a:bodyPr>
+          <a:lstStyle/>
+          <a:p>
+            <a:r>
+              <a:rPr lang="en-US" altLang="ko-KR" sz="1200" b="1" dirty="0">
+                <a:solidFill>
+                  <a:srgbClr val="FF0000"/>
+                </a:solidFill>
+              </a:rPr>
+              <a:t>(16)</a:t>
+            </a:r>
+            <a:endParaRPr lang="ko-KR" altLang="en-US" sz="1200" dirty="0"/>
+          </a:p>
+        </p:txBody>
+      </p:sp>
+      <p:sp>
+        <p:nvSpPr>
+          <p:cNvPr id="85" name="TextBox 84">
+            <a:extLst>
+              <a:ext uri="{FF2B5EF4-FFF2-40B4-BE49-F238E27FC236}">
+                <a16:creationId xmlns:a16="http://schemas.microsoft.com/office/drawing/2014/main" id="{FB05ACE0-22B3-289E-AE7A-6751DC41E6D0}"/>
+              </a:ext>
+            </a:extLst>
+          </p:cNvPr>
+          <p:cNvSpPr txBox="1"/>
+          <p:nvPr/>
+        </p:nvSpPr>
+        <p:spPr>
+          <a:xfrm>
+            <a:off x="6919096" y="2035979"/>
+            <a:ext cx="1080921" cy="276999"/>
+          </a:xfrm>
+          <a:prstGeom prst="rect">
+            <a:avLst/>
+          </a:prstGeom>
+          <a:noFill/>
+        </p:spPr>
+        <p:txBody>
+          <a:bodyPr wrap="square">
+            <a:spAutoFit/>
+          </a:bodyPr>
+          <a:lstStyle/>
+          <a:p>
+            <a:r>
+              <a:rPr lang="en-US" altLang="ko-KR" sz="1200" b="1" dirty="0">
+                <a:solidFill>
+                  <a:srgbClr val="FF0000"/>
+                </a:solidFill>
+              </a:rPr>
+              <a:t>(17)</a:t>
+            </a:r>
+            <a:endParaRPr lang="ko-KR" altLang="en-US" sz="1200" dirty="0"/>
           </a:p>
         </p:txBody>
       </p:sp>

</xml_diff>